<commit_message>
Update poster after Irlán feedback
</commit_message>
<xml_diff>
--- a/7poster/poster.pptx
+++ b/7poster/poster.pptx
@@ -63,8 +63,8 @@
         </p:nvSpPr>
         <p:spPr>
           <a:xfrm>
-            <a:off x="1513800" y="42310440"/>
-            <a:ext cx="27251280" cy="625320"/>
+            <a:off x="1513800" y="1707840"/>
+            <a:ext cx="27251280" cy="7147800"/>
           </a:xfrm>
           <a:prstGeom prst="rect">
             <a:avLst/>
@@ -100,8 +100,8 @@
         </p:nvSpPr>
         <p:spPr>
           <a:xfrm>
-            <a:off x="1513800" y="42646320"/>
-            <a:ext cx="27251280" cy="56880"/>
+            <a:off x="1513800" y="10016280"/>
+            <a:ext cx="27251280" cy="11842200"/>
           </a:xfrm>
           <a:prstGeom prst="rect">
             <a:avLst/>
@@ -136,8 +136,8 @@
         </p:nvSpPr>
         <p:spPr>
           <a:xfrm>
-            <a:off x="1513800" y="42708960"/>
-            <a:ext cx="27251280" cy="56880"/>
+            <a:off x="1513800" y="22983840"/>
+            <a:ext cx="27251280" cy="11842200"/>
           </a:xfrm>
           <a:prstGeom prst="rect">
             <a:avLst/>
@@ -194,8 +194,8 @@
         </p:nvSpPr>
         <p:spPr>
           <a:xfrm>
-            <a:off x="1513800" y="42310440"/>
-            <a:ext cx="27251280" cy="625320"/>
+            <a:off x="1513800" y="1707840"/>
+            <a:ext cx="27251280" cy="7147800"/>
           </a:xfrm>
           <a:prstGeom prst="rect">
             <a:avLst/>
@@ -231,8 +231,8 @@
         </p:nvSpPr>
         <p:spPr>
           <a:xfrm>
-            <a:off x="1513800" y="42646320"/>
-            <a:ext cx="13298400" cy="56880"/>
+            <a:off x="1513800" y="10016280"/>
+            <a:ext cx="13298400" cy="11842200"/>
           </a:xfrm>
           <a:prstGeom prst="rect">
             <a:avLst/>
@@ -267,8 +267,8 @@
         </p:nvSpPr>
         <p:spPr>
           <a:xfrm>
-            <a:off x="15477480" y="42646320"/>
-            <a:ext cx="13298400" cy="56880"/>
+            <a:off x="15477480" y="10016280"/>
+            <a:ext cx="13298400" cy="11842200"/>
           </a:xfrm>
           <a:prstGeom prst="rect">
             <a:avLst/>
@@ -303,8 +303,8 @@
         </p:nvSpPr>
         <p:spPr>
           <a:xfrm>
-            <a:off x="15477480" y="42708960"/>
-            <a:ext cx="13298400" cy="56880"/>
+            <a:off x="15477480" y="22983840"/>
+            <a:ext cx="13298400" cy="11842200"/>
           </a:xfrm>
           <a:prstGeom prst="rect">
             <a:avLst/>
@@ -339,8 +339,8 @@
         </p:nvSpPr>
         <p:spPr>
           <a:xfrm>
-            <a:off x="1513800" y="42708960"/>
-            <a:ext cx="13298400" cy="56880"/>
+            <a:off x="1513800" y="22983840"/>
+            <a:ext cx="13298400" cy="11842200"/>
           </a:xfrm>
           <a:prstGeom prst="rect">
             <a:avLst/>
@@ -397,8 +397,8 @@
         </p:nvSpPr>
         <p:spPr>
           <a:xfrm>
-            <a:off x="1513800" y="42310440"/>
-            <a:ext cx="27251280" cy="625320"/>
+            <a:off x="1513800" y="1707840"/>
+            <a:ext cx="27251280" cy="7147800"/>
           </a:xfrm>
           <a:prstGeom prst="rect">
             <a:avLst/>
@@ -434,8 +434,8 @@
         </p:nvSpPr>
         <p:spPr>
           <a:xfrm>
-            <a:off x="1513800" y="42646320"/>
-            <a:ext cx="27251280" cy="119880"/>
+            <a:off x="1513800" y="10016280"/>
+            <a:ext cx="27251280" cy="24826680"/>
           </a:xfrm>
           <a:prstGeom prst="rect">
             <a:avLst/>
@@ -470,8 +470,8 @@
         </p:nvSpPr>
         <p:spPr>
           <a:xfrm>
-            <a:off x="1513800" y="42646320"/>
-            <a:ext cx="27251280" cy="119880"/>
+            <a:off x="1513800" y="10016280"/>
+            <a:ext cx="27251280" cy="24826680"/>
           </a:xfrm>
           <a:prstGeom prst="rect">
             <a:avLst/>
@@ -506,8 +506,8 @@
         </p:blipFill>
         <p:spPr>
           <a:xfrm>
-            <a:off x="15064200" y="42645960"/>
-            <a:ext cx="150120" cy="119880"/>
+            <a:off x="1513800" y="11557800"/>
+            <a:ext cx="27251280" cy="21742920"/>
           </a:xfrm>
           <a:prstGeom prst="rect">
             <a:avLst/>
@@ -529,8 +529,8 @@
         </p:blipFill>
         <p:spPr>
           <a:xfrm>
-            <a:off x="15064200" y="42645960"/>
-            <a:ext cx="150120" cy="119880"/>
+            <a:off x="1513800" y="11557800"/>
+            <a:ext cx="27251280" cy="21742920"/>
           </a:xfrm>
           <a:prstGeom prst="rect">
             <a:avLst/>
@@ -574,8 +574,8 @@
         </p:nvSpPr>
         <p:spPr>
           <a:xfrm>
-            <a:off x="1513800" y="42310440"/>
-            <a:ext cx="27251280" cy="625320"/>
+            <a:off x="1513800" y="1707840"/>
+            <a:ext cx="27251280" cy="7147800"/>
           </a:xfrm>
           <a:prstGeom prst="rect">
             <a:avLst/>
@@ -611,8 +611,8 @@
         </p:nvSpPr>
         <p:spPr>
           <a:xfrm>
-            <a:off x="1513800" y="42478200"/>
-            <a:ext cx="27251280" cy="456120"/>
+            <a:off x="1513800" y="10016280"/>
+            <a:ext cx="27251280" cy="24826680"/>
           </a:xfrm>
           <a:prstGeom prst="rect">
             <a:avLst/>
@@ -670,8 +670,8 @@
         </p:nvSpPr>
         <p:spPr>
           <a:xfrm>
-            <a:off x="1513800" y="42310440"/>
-            <a:ext cx="27251280" cy="625320"/>
+            <a:off x="1513800" y="1707840"/>
+            <a:ext cx="27251280" cy="7147800"/>
           </a:xfrm>
           <a:prstGeom prst="rect">
             <a:avLst/>
@@ -707,8 +707,8 @@
         </p:nvSpPr>
         <p:spPr>
           <a:xfrm>
-            <a:off x="1513800" y="42646320"/>
-            <a:ext cx="27251280" cy="119880"/>
+            <a:off x="1513800" y="10016280"/>
+            <a:ext cx="27251280" cy="24826680"/>
           </a:xfrm>
           <a:prstGeom prst="rect">
             <a:avLst/>
@@ -765,8 +765,8 @@
         </p:nvSpPr>
         <p:spPr>
           <a:xfrm>
-            <a:off x="1513800" y="42310440"/>
-            <a:ext cx="27251280" cy="625320"/>
+            <a:off x="1513800" y="1707840"/>
+            <a:ext cx="27251280" cy="7147800"/>
           </a:xfrm>
           <a:prstGeom prst="rect">
             <a:avLst/>
@@ -802,8 +802,8 @@
         </p:nvSpPr>
         <p:spPr>
           <a:xfrm>
-            <a:off x="1513800" y="42646320"/>
-            <a:ext cx="13298400" cy="119880"/>
+            <a:off x="1513800" y="10016280"/>
+            <a:ext cx="13298400" cy="24826680"/>
           </a:xfrm>
           <a:prstGeom prst="rect">
             <a:avLst/>
@@ -838,8 +838,8 @@
         </p:nvSpPr>
         <p:spPr>
           <a:xfrm>
-            <a:off x="15477480" y="42646320"/>
-            <a:ext cx="13298400" cy="119880"/>
+            <a:off x="15477480" y="10016280"/>
+            <a:ext cx="13298400" cy="24826680"/>
           </a:xfrm>
           <a:prstGeom prst="rect">
             <a:avLst/>
@@ -896,8 +896,8 @@
         </p:nvSpPr>
         <p:spPr>
           <a:xfrm>
-            <a:off x="1513800" y="42310440"/>
-            <a:ext cx="27251280" cy="625320"/>
+            <a:off x="1513800" y="1707840"/>
+            <a:ext cx="27251280" cy="7147800"/>
           </a:xfrm>
           <a:prstGeom prst="rect">
             <a:avLst/>
@@ -955,8 +955,8 @@
         </p:nvSpPr>
         <p:spPr>
           <a:xfrm>
-            <a:off x="1513800" y="42458040"/>
-            <a:ext cx="27251280" cy="456120"/>
+            <a:off x="1513800" y="1707840"/>
+            <a:ext cx="27251280" cy="33134400"/>
           </a:xfrm>
           <a:prstGeom prst="rect">
             <a:avLst/>
@@ -1014,8 +1014,8 @@
         </p:nvSpPr>
         <p:spPr>
           <a:xfrm>
-            <a:off x="1513800" y="42310440"/>
-            <a:ext cx="27251280" cy="625320"/>
+            <a:off x="1513800" y="1707840"/>
+            <a:ext cx="27251280" cy="7147800"/>
           </a:xfrm>
           <a:prstGeom prst="rect">
             <a:avLst/>
@@ -1051,8 +1051,8 @@
         </p:nvSpPr>
         <p:spPr>
           <a:xfrm>
-            <a:off x="1513800" y="42646320"/>
-            <a:ext cx="13298400" cy="56880"/>
+            <a:off x="1513800" y="10016280"/>
+            <a:ext cx="13298400" cy="11842200"/>
           </a:xfrm>
           <a:prstGeom prst="rect">
             <a:avLst/>
@@ -1087,8 +1087,8 @@
         </p:nvSpPr>
         <p:spPr>
           <a:xfrm>
-            <a:off x="1513800" y="42708960"/>
-            <a:ext cx="13298400" cy="56880"/>
+            <a:off x="1513800" y="22983840"/>
+            <a:ext cx="13298400" cy="11842200"/>
           </a:xfrm>
           <a:prstGeom prst="rect">
             <a:avLst/>
@@ -1123,8 +1123,8 @@
         </p:nvSpPr>
         <p:spPr>
           <a:xfrm>
-            <a:off x="15477480" y="42646320"/>
-            <a:ext cx="13298400" cy="119880"/>
+            <a:off x="15477480" y="10016280"/>
+            <a:ext cx="13298400" cy="24826680"/>
           </a:xfrm>
           <a:prstGeom prst="rect">
             <a:avLst/>
@@ -1181,8 +1181,8 @@
         </p:nvSpPr>
         <p:spPr>
           <a:xfrm>
-            <a:off x="1513800" y="42310440"/>
-            <a:ext cx="27251280" cy="625320"/>
+            <a:off x="1513800" y="1707840"/>
+            <a:ext cx="27251280" cy="7147800"/>
           </a:xfrm>
           <a:prstGeom prst="rect">
             <a:avLst/>
@@ -1218,8 +1218,8 @@
         </p:nvSpPr>
         <p:spPr>
           <a:xfrm>
-            <a:off x="1513800" y="42646320"/>
-            <a:ext cx="13298400" cy="119880"/>
+            <a:off x="1513800" y="10016280"/>
+            <a:ext cx="13298400" cy="24826680"/>
           </a:xfrm>
           <a:prstGeom prst="rect">
             <a:avLst/>
@@ -1254,8 +1254,8 @@
         </p:nvSpPr>
         <p:spPr>
           <a:xfrm>
-            <a:off x="15477480" y="42646320"/>
-            <a:ext cx="13298400" cy="56880"/>
+            <a:off x="15477480" y="10016280"/>
+            <a:ext cx="13298400" cy="11842200"/>
           </a:xfrm>
           <a:prstGeom prst="rect">
             <a:avLst/>
@@ -1290,8 +1290,8 @@
         </p:nvSpPr>
         <p:spPr>
           <a:xfrm>
-            <a:off x="15477480" y="42708960"/>
-            <a:ext cx="13298400" cy="56880"/>
+            <a:off x="15477480" y="22983840"/>
+            <a:ext cx="13298400" cy="11842200"/>
           </a:xfrm>
           <a:prstGeom prst="rect">
             <a:avLst/>
@@ -1348,8 +1348,8 @@
         </p:nvSpPr>
         <p:spPr>
           <a:xfrm>
-            <a:off x="1513800" y="42310440"/>
-            <a:ext cx="27251280" cy="625320"/>
+            <a:off x="1513800" y="1707840"/>
+            <a:ext cx="27251280" cy="7147800"/>
           </a:xfrm>
           <a:prstGeom prst="rect">
             <a:avLst/>
@@ -1385,8 +1385,8 @@
         </p:nvSpPr>
         <p:spPr>
           <a:xfrm>
-            <a:off x="1513800" y="42646320"/>
-            <a:ext cx="13298400" cy="56880"/>
+            <a:off x="1513800" y="10016280"/>
+            <a:ext cx="13298400" cy="11842200"/>
           </a:xfrm>
           <a:prstGeom prst="rect">
             <a:avLst/>
@@ -1421,8 +1421,8 @@
         </p:nvSpPr>
         <p:spPr>
           <a:xfrm>
-            <a:off x="15477480" y="42646320"/>
-            <a:ext cx="13298400" cy="56880"/>
+            <a:off x="15477480" y="10016280"/>
+            <a:ext cx="13298400" cy="11842200"/>
           </a:xfrm>
           <a:prstGeom prst="rect">
             <a:avLst/>
@@ -1457,8 +1457,8 @@
         </p:nvSpPr>
         <p:spPr>
           <a:xfrm>
-            <a:off x="1513800" y="42708960"/>
-            <a:ext cx="27251280" cy="56880"/>
+            <a:off x="1513800" y="22983840"/>
+            <a:ext cx="27251280" cy="11842200"/>
           </a:xfrm>
           <a:prstGeom prst="rect">
             <a:avLst/>
@@ -1578,8 +1578,8 @@
         </p:nvSpPr>
         <p:spPr>
           <a:xfrm>
-            <a:off x="1513800" y="42606000"/>
-            <a:ext cx="27251280" cy="34200"/>
+            <a:off x="1513800" y="1707840"/>
+            <a:ext cx="27251280" cy="7147800"/>
           </a:xfrm>
           <a:prstGeom prst="rect">
             <a:avLst/>
@@ -1629,8 +1629,8 @@
         </p:nvSpPr>
         <p:spPr>
           <a:xfrm>
-            <a:off x="1513800" y="42646320"/>
-            <a:ext cx="27251280" cy="119880"/>
+            <a:off x="1513800" y="10016280"/>
+            <a:ext cx="27251280" cy="24826680"/>
           </a:xfrm>
           <a:prstGeom prst="rect">
             <a:avLst/>
@@ -1938,7 +1938,7 @@
         <p:spPr>
           <a:xfrm>
             <a:off x="6384240" y="6480"/>
-            <a:ext cx="21934080" cy="2191680"/>
+            <a:ext cx="21933720" cy="2191320"/>
           </a:xfrm>
           <a:prstGeom prst="rect">
             <a:avLst/>
@@ -2000,7 +2000,7 @@
         <p:spPr>
           <a:xfrm>
             <a:off x="5028480" y="2653560"/>
-            <a:ext cx="24833880" cy="1507320"/>
+            <a:ext cx="24833520" cy="1506960"/>
           </a:xfrm>
           <a:prstGeom prst="rect">
             <a:avLst/>
@@ -2090,7 +2090,7 @@
         <p:spPr>
           <a:xfrm>
             <a:off x="1026360" y="5924160"/>
-            <a:ext cx="12871800" cy="2007360"/>
+            <a:ext cx="12871440" cy="2007000"/>
           </a:xfrm>
           <a:prstGeom prst="rect">
             <a:avLst/>
@@ -2156,7 +2156,7 @@
         <p:spPr>
           <a:xfrm>
             <a:off x="19578600" y="39930480"/>
-            <a:ext cx="8555760" cy="2099160"/>
+            <a:ext cx="8555400" cy="2098800"/>
           </a:xfrm>
           <a:prstGeom prst="rect">
             <a:avLst/>
@@ -2206,7 +2206,7 @@
         <p:spPr>
           <a:xfrm>
             <a:off x="1026360" y="7200360"/>
-            <a:ext cx="11274120" cy="696960"/>
+            <a:ext cx="11273760" cy="696600"/>
           </a:xfrm>
           <a:prstGeom prst="rect">
             <a:avLst/>
@@ -2232,7 +2232,7 @@
         <p:spPr>
           <a:xfrm>
             <a:off x="4509360" y="40060440"/>
-            <a:ext cx="10411560" cy="1717200"/>
+            <a:ext cx="10411200" cy="1716840"/>
           </a:xfrm>
           <a:prstGeom prst="rect">
             <a:avLst/>
@@ -2327,7 +2327,7 @@
         <p:spPr>
           <a:xfrm>
             <a:off x="1098360" y="39512520"/>
-            <a:ext cx="3721320" cy="2304360"/>
+            <a:ext cx="3720960" cy="2304000"/>
           </a:xfrm>
           <a:prstGeom prst="rect">
             <a:avLst/>
@@ -2419,7 +2419,7 @@
         <p:spPr>
           <a:xfrm>
             <a:off x="14356080" y="7178760"/>
-            <a:ext cx="11274120" cy="696960"/>
+            <a:ext cx="11273760" cy="696600"/>
           </a:xfrm>
           <a:prstGeom prst="rect">
             <a:avLst/>
@@ -2445,7 +2445,7 @@
         <p:spPr>
           <a:xfrm>
             <a:off x="14356080" y="7178760"/>
-            <a:ext cx="11274120" cy="696960"/>
+            <a:ext cx="11273760" cy="696600"/>
           </a:xfrm>
           <a:prstGeom prst="rect">
             <a:avLst/>
@@ -2470,8 +2470,8 @@
         </p:nvSpPr>
         <p:spPr>
           <a:xfrm>
-            <a:off x="914400" y="23745240"/>
-            <a:ext cx="14849640" cy="1550160"/>
+            <a:off x="914400" y="23169240"/>
+            <a:ext cx="14849280" cy="1549800"/>
           </a:xfrm>
           <a:prstGeom prst="rect">
             <a:avLst/>
@@ -2532,8 +2532,8 @@
         </p:nvSpPr>
         <p:spPr>
           <a:xfrm>
-            <a:off x="916200" y="20382840"/>
-            <a:ext cx="13987800" cy="3541680"/>
+            <a:off x="15087600" y="12369240"/>
+            <a:ext cx="13987440" cy="2626920"/>
           </a:xfrm>
           <a:prstGeom prst="rect">
             <a:avLst/>
@@ -2552,16 +2552,15 @@
         <p:txBody>
           <a:bodyPr lIns="90000" rIns="90000" tIns="45000" bIns="45000"/>
           <a:p>
-            <a:pPr marL="320040" indent="-319320">
+            <a:pPr marL="548640" indent="-548640">
               <a:lnSpc>
                 <a:spcPct val="100000"/>
               </a:lnSpc>
               <a:buClr>
                 <a:srgbClr val="000000"/>
               </a:buClr>
-              <a:buSzPct val="45000"/>
               <a:buFont typeface="Wingdings" charset="2"/>
-              <a:buChar char=""/>
+              <a:buChar char=""/>
             </a:pPr>
             <a:r>
               <a:rPr b="1" lang="en-US" sz="4000" spc="-1" strike="noStrike">
@@ -2576,7 +2575,7 @@
                 <a:latin typeface="Calibri"/>
                 <a:ea typeface="DejaVu Sans"/>
               </a:rPr>
-              <a:t>We found few relevant works managing similar problems. </a:t>
+              <a:t>Web Service to access the features of Apache Jena and other Java libraries.</a:t>
             </a:r>
             <a:endParaRPr b="0" lang="en-US" sz="1800" spc="-1" strike="noStrike">
               <a:solidFill>
@@ -2591,16 +2590,15 @@
             </a:endParaRPr>
           </a:p>
           <a:p>
-            <a:pPr marL="320040" indent="-319320">
+            <a:pPr marL="548640" indent="-548640">
               <a:lnSpc>
                 <a:spcPct val="100000"/>
               </a:lnSpc>
               <a:buClr>
                 <a:srgbClr val="000000"/>
               </a:buClr>
-              <a:buSzPct val="45000"/>
               <a:buFont typeface="Wingdings" charset="2"/>
-              <a:buChar char=""/>
+              <a:buChar char=""/>
             </a:pPr>
             <a:r>
               <a:rPr b="1" lang="en-US" sz="4000" spc="-1" strike="noStrike">
@@ -2615,85 +2613,7 @@
                 <a:latin typeface="Calibri"/>
                 <a:ea typeface="DejaVu Sans"/>
               </a:rPr>
-              <a:t>Understand some details from OPC UA documentation.</a:t>
-            </a:r>
-            <a:endParaRPr b="0" lang="en-US" sz="1800" spc="-1" strike="noStrike">
-              <a:solidFill>
-                <a:srgbClr val="000000"/>
-              </a:solidFill>
-              <a:uFill>
-                <a:solidFill>
-                  <a:srgbClr val="ffffff"/>
-                </a:solidFill>
-              </a:uFill>
-              <a:latin typeface="Arial"/>
-            </a:endParaRPr>
-          </a:p>
-          <a:p>
-            <a:pPr marL="320040" indent="-319320">
-              <a:lnSpc>
-                <a:spcPct val="100000"/>
-              </a:lnSpc>
-              <a:buClr>
-                <a:srgbClr val="000000"/>
-              </a:buClr>
-              <a:buSzPct val="45000"/>
-              <a:buFont typeface="Wingdings" charset="2"/>
-              <a:buChar char=""/>
-            </a:pPr>
-            <a:r>
-              <a:rPr b="1" lang="en-US" sz="4000" spc="-1" strike="noStrike">
-                <a:solidFill>
-                  <a:srgbClr val="000000"/>
-                </a:solidFill>
-                <a:uFill>
-                  <a:solidFill>
-                    <a:srgbClr val="ffffff"/>
-                  </a:solidFill>
-                </a:uFill>
-                <a:latin typeface="Calibri"/>
-                <a:ea typeface="DejaVu Sans"/>
-              </a:rPr>
-              <a:t>The access to the original files was restricted and private. We had few (but enough) material to work with.</a:t>
-            </a:r>
-            <a:endParaRPr b="0" lang="en-US" sz="1800" spc="-1" strike="noStrike">
-              <a:solidFill>
-                <a:srgbClr val="000000"/>
-              </a:solidFill>
-              <a:uFill>
-                <a:solidFill>
-                  <a:srgbClr val="ffffff"/>
-                </a:solidFill>
-              </a:uFill>
-              <a:latin typeface="Arial"/>
-            </a:endParaRPr>
-          </a:p>
-          <a:p>
-            <a:pPr marL="320040" indent="-319320">
-              <a:lnSpc>
-                <a:spcPct val="100000"/>
-              </a:lnSpc>
-              <a:buClr>
-                <a:srgbClr val="000000"/>
-              </a:buClr>
-              <a:buSzPct val="45000"/>
-              <a:buFont typeface="Wingdings" charset="2"/>
-              <a:buChar char=""/>
-            </a:pPr>
-            <a:r>
-              <a:rPr b="1" lang="en-US" sz="4000" spc="-1" strike="noStrike">
-                <a:solidFill>
-                  <a:srgbClr val="000000"/>
-                </a:solidFill>
-                <a:uFill>
-                  <a:solidFill>
-                    <a:srgbClr val="ffffff"/>
-                  </a:solidFill>
-                </a:uFill>
-                <a:latin typeface="Calibri"/>
-                <a:ea typeface="DejaVu Sans"/>
-              </a:rPr>
-              <a:t>Plug different technologies in the front-end and back-end.</a:t>
+              <a:t>A Web application developed in Node.js to interact with the web service above.</a:t>
             </a:r>
             <a:endParaRPr b="0" lang="en-US" sz="1800" spc="-1" strike="noStrike">
               <a:solidFill>
@@ -2718,7 +2638,7 @@
         <p:spPr>
           <a:xfrm>
             <a:off x="10425240" y="4070880"/>
-            <a:ext cx="13896360" cy="912960"/>
+            <a:ext cx="13896000" cy="912600"/>
           </a:xfrm>
           <a:prstGeom prst="rect">
             <a:avLst/>
@@ -2784,7 +2704,7 @@
         <p:spPr>
           <a:xfrm>
             <a:off x="1747800" y="1576080"/>
-            <a:ext cx="2804040" cy="2514960"/>
+            <a:ext cx="2803680" cy="2514600"/>
           </a:xfrm>
           <a:prstGeom prst="rect">
             <a:avLst/>
@@ -2806,8 +2726,8 @@
         </p:blipFill>
         <p:spPr>
           <a:xfrm>
-            <a:off x="1535040" y="15153120"/>
-            <a:ext cx="5206320" cy="2925360"/>
+            <a:off x="1535040" y="14253120"/>
+            <a:ext cx="5205960" cy="2925000"/>
           </a:xfrm>
           <a:prstGeom prst="rect">
             <a:avLst/>
@@ -2829,8 +2749,8 @@
         </p:blipFill>
         <p:spPr>
           <a:xfrm>
-            <a:off x="5841000" y="13313520"/>
-            <a:ext cx="8350200" cy="4912560"/>
+            <a:off x="5841000" y="12845520"/>
+            <a:ext cx="8349840" cy="4912200"/>
           </a:xfrm>
           <a:prstGeom prst="rect">
             <a:avLst/>
@@ -2848,8 +2768,8 @@
         </p:nvSpPr>
         <p:spPr>
           <a:xfrm flipH="1">
-            <a:off x="845640" y="7399800"/>
-            <a:ext cx="13075200" cy="5296320"/>
+            <a:off x="842760" y="7327800"/>
+            <a:ext cx="13074840" cy="5124600"/>
           </a:xfrm>
           <a:prstGeom prst="foldedCorner">
             <a:avLst>
@@ -2857,27 +2777,21 @@
             </a:avLst>
           </a:prstGeom>
           <a:solidFill>
-            <a:schemeClr val="accent6">
-              <a:lumMod val="75000"/>
+            <a:srgbClr val="e46c0a">
               <a:alpha val="54000"/>
-            </a:schemeClr>
+            </a:srgbClr>
           </a:solidFill>
-          <a:ln>
+          <a:ln w="25560">
+            <a:solidFill>
+              <a:srgbClr val="3a5f8b"/>
+            </a:solidFill>
             <a:round/>
           </a:ln>
         </p:spPr>
         <p:style>
-          <a:lnRef idx="2">
-            <a:schemeClr val="accent1">
-              <a:shade val="50000"/>
-            </a:schemeClr>
-          </a:lnRef>
-          <a:fillRef idx="1">
-            <a:schemeClr val="accent1"/>
-          </a:fillRef>
-          <a:effectRef idx="0">
-            <a:schemeClr val="accent1"/>
-          </a:effectRef>
+          <a:lnRef idx="0"/>
+          <a:fillRef idx="0"/>
+          <a:effectRef idx="0"/>
           <a:fontRef idx="minor"/>
         </p:style>
         <p:txBody>
@@ -2919,7 +2833,7 @@
             </a:endParaRPr>
           </a:p>
           <a:p>
-            <a:pPr marL="571680" indent="-570600" algn="just">
+            <a:pPr marL="571680" indent="-570240" algn="just">
               <a:lnSpc>
                 <a:spcPct val="100000"/>
               </a:lnSpc>
@@ -2942,7 +2856,7 @@
                 <a:latin typeface="Calibri"/>
                 <a:ea typeface="DejaVu Sans"/>
               </a:rPr>
-              <a:t>OPC UA is playing a key role the Industry 4.0 (i4.0), the so called fourth industrial revolution whose purpose is to make reality the vision of smart factories</a:t>
+              <a:t>OPC UA is playing a key role the Industry 4.0 (i4.0), the so called fourth industrial revolution whose purpose is to make reality the vision of smart factories.</a:t>
             </a:r>
             <a:endParaRPr b="0" lang="en-US" sz="1800" spc="-1" strike="noStrike">
               <a:solidFill>
@@ -2957,7 +2871,7 @@
             </a:endParaRPr>
           </a:p>
           <a:p>
-            <a:pPr marL="571680" indent="-570600" algn="just">
+            <a:pPr marL="571680" indent="-570240" algn="just">
               <a:lnSpc>
                 <a:spcPct val="100000"/>
               </a:lnSpc>
@@ -2980,7 +2894,7 @@
                 <a:latin typeface="Calibri"/>
                 <a:ea typeface="DejaVu Sans"/>
               </a:rPr>
-              <a:t>It is the leading standard for interoperability and data exchange</a:t>
+              <a:t>It is the leading standard for interoperability and data exchange.</a:t>
             </a:r>
             <a:endParaRPr b="0" lang="en-US" sz="1800" spc="-1" strike="noStrike">
               <a:solidFill>
@@ -2995,7 +2909,7 @@
             </a:endParaRPr>
           </a:p>
           <a:p>
-            <a:pPr marL="571680" indent="-570600" algn="just">
+            <a:pPr marL="571680" indent="-570240" algn="just">
               <a:lnSpc>
                 <a:spcPct val="100000"/>
               </a:lnSpc>
@@ -3018,7 +2932,7 @@
                 <a:latin typeface="Calibri"/>
                 <a:ea typeface="DejaVu Sans"/>
               </a:rPr>
-              <a:t>Even more, OPC UA is becoming popular in other markets like the Internet of Things (IoT)</a:t>
+              <a:t>Even more, OPC UA is becoming popular in other markets like the Internet of Things (IoT).</a:t>
             </a:r>
             <a:endParaRPr b="0" lang="en-US" sz="1800" spc="-1" strike="noStrike">
               <a:solidFill>
@@ -3042,8 +2956,8 @@
         </p:nvSpPr>
         <p:spPr>
           <a:xfrm flipH="1">
-            <a:off x="15158880" y="7409880"/>
-            <a:ext cx="14125680" cy="5286240"/>
+            <a:off x="15156000" y="7301880"/>
+            <a:ext cx="14125320" cy="3560040"/>
           </a:xfrm>
           <a:prstGeom prst="foldedCorner">
             <a:avLst>
@@ -3055,7 +2969,7 @@
               <a:alpha val="54000"/>
             </a:srgbClr>
           </a:solidFill>
-          <a:ln>
+          <a:ln w="25560">
             <a:solidFill>
               <a:srgbClr val="0066cc"/>
             </a:solidFill>
@@ -3063,17 +2977,9 @@
           </a:ln>
         </p:spPr>
         <p:style>
-          <a:lnRef idx="2">
-            <a:schemeClr val="accent1">
-              <a:shade val="50000"/>
-            </a:schemeClr>
-          </a:lnRef>
-          <a:fillRef idx="1">
-            <a:schemeClr val="accent1"/>
-          </a:fillRef>
-          <a:effectRef idx="0">
-            <a:schemeClr val="accent1"/>
-          </a:effectRef>
+          <a:lnRef idx="0"/>
+          <a:fillRef idx="0"/>
+          <a:effectRef idx="0"/>
           <a:fontRef idx="minor"/>
         </p:style>
         <p:txBody>
@@ -3097,7 +3003,7 @@
             </a:endParaRPr>
           </a:p>
           <a:p>
-            <a:pPr marL="571680" indent="-570600" algn="just">
+            <a:pPr marL="571680" indent="-570240" algn="just">
               <a:lnSpc>
                 <a:spcPct val="100000"/>
               </a:lnSpc>
@@ -3120,7 +3026,7 @@
                 <a:latin typeface="Calibri"/>
                 <a:ea typeface="DejaVu Sans"/>
               </a:rPr>
-              <a:t>We build a web tool to transform the schema and instance XML files from OPC UA into semantic ontologies.</a:t>
+              <a:t>A web tool to transform the schema and instance XML files from OPC UA into semantic ontologies.</a:t>
             </a:r>
             <a:endParaRPr b="0" lang="en-US" sz="1800" spc="-1" strike="noStrike">
               <a:solidFill>
@@ -3135,7 +3041,7 @@
             </a:endParaRPr>
           </a:p>
           <a:p>
-            <a:pPr marL="571680" indent="-570600" algn="just">
+            <a:pPr marL="571680" indent="-570240" algn="just">
               <a:lnSpc>
                 <a:spcPct val="100000"/>
               </a:lnSpc>
@@ -3158,83 +3064,7 @@
                 <a:latin typeface="Calibri"/>
                 <a:ea typeface="DejaVu Sans"/>
               </a:rPr>
-              <a:t>The architecture of our solution was implemented in two parts:</a:t>
-            </a:r>
-            <a:endParaRPr b="0" lang="en-US" sz="1800" spc="-1" strike="noStrike">
-              <a:solidFill>
-                <a:srgbClr val="000000"/>
-              </a:solidFill>
-              <a:uFill>
-                <a:solidFill>
-                  <a:srgbClr val="ffffff"/>
-                </a:solidFill>
-              </a:uFill>
-              <a:latin typeface="Arial"/>
-            </a:endParaRPr>
-          </a:p>
-          <a:p>
-            <a:pPr marL="731520" indent="-730800" algn="just">
-              <a:lnSpc>
-                <a:spcPct val="100000"/>
-              </a:lnSpc>
-              <a:buClr>
-                <a:srgbClr val="000000"/>
-              </a:buClr>
-              <a:buFont typeface="Liberation Serif"/>
-              <a:buAutoNum type="alphaLcParenR"/>
-            </a:pPr>
-            <a:r>
-              <a:rPr b="1" lang="en-US" sz="4000" spc="-1" strike="noStrike">
-                <a:solidFill>
-                  <a:srgbClr val="000000"/>
-                </a:solidFill>
-                <a:uFill>
-                  <a:solidFill>
-                    <a:srgbClr val="ffffff"/>
-                  </a:solidFill>
-                </a:uFill>
-                <a:latin typeface="Calibri"/>
-                <a:ea typeface="DejaVu Sans"/>
-              </a:rPr>
-              <a:t>Web Service to access the features of Apache Jena and other Java libraries.</a:t>
-            </a:r>
-            <a:endParaRPr b="0" lang="en-US" sz="1800" spc="-1" strike="noStrike">
-              <a:solidFill>
-                <a:srgbClr val="000000"/>
-              </a:solidFill>
-              <a:uFill>
-                <a:solidFill>
-                  <a:srgbClr val="ffffff"/>
-                </a:solidFill>
-              </a:uFill>
-              <a:latin typeface="Arial"/>
-            </a:endParaRPr>
-          </a:p>
-          <a:p>
-            <a:pPr marL="731520" indent="-730800" algn="just">
-              <a:lnSpc>
-                <a:spcPct val="100000"/>
-              </a:lnSpc>
-              <a:buClr>
-                <a:srgbClr val="000000"/>
-              </a:buClr>
-              <a:buFont typeface="Liberation Serif"/>
-              <a:buAutoNum type="alphaLcParenR"/>
-            </a:pPr>
-            <a:r>
-              <a:rPr b="1" lang="en-US" sz="4000" spc="-1" strike="noStrike">
-                <a:solidFill>
-                  <a:srgbClr val="000000"/>
-                </a:solidFill>
-                <a:uFill>
-                  <a:solidFill>
-                    <a:srgbClr val="ffffff"/>
-                  </a:solidFill>
-                </a:uFill>
-                <a:latin typeface="Calibri"/>
-                <a:ea typeface="DejaVu Sans"/>
-              </a:rPr>
-              <a:t>A Web application developed in Node.js to interact with the web service above.</a:t>
+              <a:t>This translation matters because adds the ability to express not only data but also the meaning of this data. It is a key piece in the quest to make a system more intelligent.</a:t>
             </a:r>
             <a:endParaRPr b="0" lang="en-US" sz="1800" spc="-1" strike="noStrike">
               <a:solidFill>
@@ -3258,8 +3088,8 @@
         </p:nvSpPr>
         <p:spPr>
           <a:xfrm>
-            <a:off x="15138360" y="5924160"/>
-            <a:ext cx="14121720" cy="2007360"/>
+            <a:off x="15138360" y="6008040"/>
+            <a:ext cx="14121360" cy="1905120"/>
           </a:xfrm>
           <a:prstGeom prst="rect">
             <a:avLst/>
@@ -3296,7 +3126,7 @@
                 <a:latin typeface="Calibri"/>
                 <a:ea typeface="DejaVu Sans"/>
               </a:rPr>
-              <a:t>What we did</a:t>
+              <a:t>What we did...</a:t>
             </a:r>
             <a:endParaRPr b="0" lang="en-US" sz="1800" spc="-1" strike="noStrike">
               <a:solidFill>
@@ -3320,8 +3150,8 @@
         </p:nvSpPr>
         <p:spPr>
           <a:xfrm>
-            <a:off x="914400" y="18826200"/>
-            <a:ext cx="14849640" cy="2007360"/>
+            <a:off x="842400" y="17890200"/>
+            <a:ext cx="14849280" cy="2007000"/>
           </a:xfrm>
           <a:prstGeom prst="rect">
             <a:avLst/>
@@ -3386,8 +3216,8 @@
         </p:blipFill>
         <p:spPr>
           <a:xfrm>
-            <a:off x="17965440" y="14924880"/>
-            <a:ext cx="8801280" cy="5813640"/>
+            <a:off x="17965440" y="15212880"/>
+            <a:ext cx="8800920" cy="5813280"/>
           </a:xfrm>
           <a:prstGeom prst="rect">
             <a:avLst/>
@@ -3409,8 +3239,8 @@
         </p:blipFill>
         <p:spPr>
           <a:xfrm>
-            <a:off x="27016560" y="16626600"/>
-            <a:ext cx="2122920" cy="1083600"/>
+            <a:off x="26980560" y="17274600"/>
+            <a:ext cx="2122560" cy="1083240"/>
           </a:xfrm>
           <a:prstGeom prst="rect">
             <a:avLst/>
@@ -3432,8 +3262,8 @@
         </p:blipFill>
         <p:spPr>
           <a:xfrm>
-            <a:off x="27163440" y="18141480"/>
-            <a:ext cx="1852920" cy="1419840"/>
+            <a:off x="27127440" y="18789480"/>
+            <a:ext cx="1852560" cy="1419480"/>
           </a:xfrm>
           <a:prstGeom prst="rect">
             <a:avLst/>
@@ -3455,8 +3285,8 @@
         </p:blipFill>
         <p:spPr>
           <a:xfrm>
-            <a:off x="26978040" y="14799960"/>
-            <a:ext cx="2282040" cy="1279440"/>
+            <a:off x="26942040" y="15447960"/>
+            <a:ext cx="2281680" cy="1279080"/>
           </a:xfrm>
           <a:prstGeom prst="rect">
             <a:avLst/>
@@ -3478,8 +3308,8 @@
         </p:blipFill>
         <p:spPr>
           <a:xfrm>
-            <a:off x="26838000" y="19357920"/>
-            <a:ext cx="2339280" cy="1753560"/>
+            <a:off x="26802000" y="20005920"/>
+            <a:ext cx="2338920" cy="1753200"/>
           </a:xfrm>
           <a:prstGeom prst="rect">
             <a:avLst/>
@@ -3502,7 +3332,7 @@
         <p:spPr>
           <a:xfrm>
             <a:off x="15436800" y="19538280"/>
-            <a:ext cx="2924280" cy="1521360"/>
+            <a:ext cx="2923920" cy="1521000"/>
           </a:xfrm>
           <a:prstGeom prst="rect">
             <a:avLst/>
@@ -3524,8 +3354,8 @@
         </p:blipFill>
         <p:spPr>
           <a:xfrm>
-            <a:off x="15583680" y="18011160"/>
-            <a:ext cx="1188000" cy="1108080"/>
+            <a:off x="15583680" y="18119160"/>
+            <a:ext cx="1187640" cy="1107720"/>
           </a:xfrm>
           <a:prstGeom prst="rect">
             <a:avLst/>
@@ -3547,8 +3377,8 @@
         </p:blipFill>
         <p:spPr>
           <a:xfrm>
-            <a:off x="15377400" y="16615080"/>
-            <a:ext cx="2073240" cy="988560"/>
+            <a:off x="15377400" y="16759080"/>
+            <a:ext cx="2072880" cy="988200"/>
           </a:xfrm>
           <a:prstGeom prst="rect">
             <a:avLst/>
@@ -3570,8 +3400,8 @@
         </p:blipFill>
         <p:spPr>
           <a:xfrm>
-            <a:off x="15462360" y="15096600"/>
-            <a:ext cx="2151720" cy="1074600"/>
+            <a:off x="15462360" y="15384600"/>
+            <a:ext cx="2151360" cy="1074240"/>
           </a:xfrm>
           <a:prstGeom prst="rect">
             <a:avLst/>
@@ -3589,8 +3419,8 @@
         </p:nvSpPr>
         <p:spPr>
           <a:xfrm>
-            <a:off x="15087600" y="13177080"/>
-            <a:ext cx="14172480" cy="2007360"/>
+            <a:off x="15087600" y="10945080"/>
+            <a:ext cx="14172120" cy="1413000"/>
           </a:xfrm>
           <a:prstGeom prst="rect">
             <a:avLst/>
@@ -3656,7 +3486,7 @@
         <p:spPr>
           <a:xfrm>
             <a:off x="17547840" y="21688200"/>
-            <a:ext cx="10332000" cy="5394240"/>
+            <a:ext cx="10331640" cy="5393880"/>
           </a:xfrm>
           <a:prstGeom prst="rect">
             <a:avLst/>
@@ -3679,7 +3509,7 @@
         <p:spPr>
           <a:xfrm>
             <a:off x="17550720" y="27460800"/>
-            <a:ext cx="10423440" cy="5394240"/>
+            <a:ext cx="10423080" cy="5393880"/>
           </a:xfrm>
           <a:prstGeom prst="rect">
             <a:avLst/>
@@ -3702,7 +3532,7 @@
         <p:spPr>
           <a:xfrm>
             <a:off x="17495280" y="33303240"/>
-            <a:ext cx="10514880" cy="5394240"/>
+            <a:ext cx="10514520" cy="5393880"/>
           </a:xfrm>
           <a:prstGeom prst="rect">
             <a:avLst/>
@@ -3721,7 +3551,7 @@
         <p:spPr>
           <a:xfrm>
             <a:off x="27223920" y="26282520"/>
-            <a:ext cx="1958400" cy="1967040"/>
+            <a:ext cx="1958040" cy="1966680"/>
           </a:xfrm>
           <a:custGeom>
             <a:avLst/>
@@ -4322,7 +4152,7 @@
         <p:spPr>
           <a:xfrm>
             <a:off x="27224280" y="32125680"/>
-            <a:ext cx="1958400" cy="1967040"/>
+            <a:ext cx="1958040" cy="1966680"/>
           </a:xfrm>
           <a:custGeom>
             <a:avLst/>
@@ -4922,8 +4752,8 @@
         </p:nvSpPr>
         <p:spPr>
           <a:xfrm>
-            <a:off x="-548640" y="31626720"/>
-            <a:ext cx="14538240" cy="1826280"/>
+            <a:off x="-1124640" y="31122720"/>
+            <a:ext cx="14537880" cy="3215520"/>
           </a:xfrm>
           <a:prstGeom prst="rect">
             <a:avLst/>
@@ -5038,7 +4868,7 @@
                 <a:latin typeface="Calibri"/>
                 <a:ea typeface="DejaVu Sans"/>
               </a:rPr>
-              <a:t>Apache Tomcat 7.0, Node.js, Java 8, Docker.</a:t>
+              <a:t>Apache Tomcat 7.0, Java 8.0, Node.js.</a:t>
             </a:r>
             <a:endParaRPr b="0" lang="en-US" sz="1800" spc="-1" strike="noStrike">
               <a:solidFill>
@@ -5086,7 +4916,7 @@
                 <a:latin typeface="Calibri"/>
                 <a:ea typeface="DejaVu Sans"/>
               </a:rPr>
-              <a:t>2GB </a:t>
+              <a:t>2GB</a:t>
             </a:r>
             <a:endParaRPr b="0" lang="en-US" sz="1800" spc="-1" strike="noStrike">
               <a:solidFill>
@@ -5107,7 +4937,7 @@
               </a:lnSpc>
             </a:pPr>
             <a:r>
-              <a:rPr b="0" lang="en-US" sz="3600" spc="-1" strike="noStrike">
+              <a:rPr b="1" lang="en-US" sz="3600" spc="-1" strike="noStrike">
                 <a:solidFill>
                   <a:srgbClr val="000000"/>
                 </a:solidFill>
@@ -5119,7 +4949,22 @@
                 <a:latin typeface="Calibri"/>
                 <a:ea typeface="DejaVu Sans"/>
               </a:rPr>
-              <a:t> </a:t>
+              <a:t>How to access to the app? </a:t>
+            </a:r>
+            <a:r>
+              <a:rPr b="0" lang="en-US" sz="3600" spc="-1" strike="noStrike">
+                <a:solidFill>
+                  <a:srgbClr val="ff6600"/>
+                </a:solidFill>
+                <a:uFill>
+                  <a:solidFill>
+                    <a:srgbClr val="ffffff"/>
+                  </a:solidFill>
+                </a:uFill>
+                <a:latin typeface="Calibri"/>
+                <a:ea typeface="DejaVu Sans"/>
+              </a:rPr>
+              <a:t>Open the browser and go the address: http://localhost:3000</a:t>
             </a:r>
             <a:endParaRPr b="0" lang="en-US" sz="1800" spc="-1" strike="noStrike">
               <a:solidFill>
@@ -5157,6 +5002,57 @@
                 <a:spcPct val="100000"/>
               </a:lnSpc>
             </a:pPr>
+            <a:r>
+              <a:rPr b="0" lang="en-US" sz="3600" spc="-1" strike="noStrike">
+                <a:solidFill>
+                  <a:srgbClr val="000000"/>
+                </a:solidFill>
+                <a:uFill>
+                  <a:solidFill>
+                    <a:srgbClr val="ffffff"/>
+                  </a:solidFill>
+                </a:uFill>
+                <a:latin typeface="Calibri"/>
+                <a:ea typeface="DejaVu Sans"/>
+              </a:rPr>
+              <a:t> </a:t>
+            </a:r>
+            <a:endParaRPr b="0" lang="en-US" sz="1800" spc="-1" strike="noStrike">
+              <a:solidFill>
+                <a:srgbClr val="000000"/>
+              </a:solidFill>
+              <a:uFill>
+                <a:solidFill>
+                  <a:srgbClr val="ffffff"/>
+                </a:solidFill>
+              </a:uFill>
+              <a:latin typeface="Arial"/>
+            </a:endParaRPr>
+          </a:p>
+          <a:p>
+            <a:pPr marL="2160000">
+              <a:lnSpc>
+                <a:spcPct val="100000"/>
+              </a:lnSpc>
+            </a:pPr>
+            <a:endParaRPr b="0" lang="en-US" sz="1800" spc="-1" strike="noStrike">
+              <a:solidFill>
+                <a:srgbClr val="000000"/>
+              </a:solidFill>
+              <a:uFill>
+                <a:solidFill>
+                  <a:srgbClr val="ffffff"/>
+                </a:solidFill>
+              </a:uFill>
+              <a:latin typeface="Arial"/>
+            </a:endParaRPr>
+          </a:p>
+          <a:p>
+            <a:pPr marL="2160000">
+              <a:lnSpc>
+                <a:spcPct val="100000"/>
+              </a:lnSpc>
+            </a:pPr>
             <a:endParaRPr b="0" lang="en-US" sz="1800" spc="-1" strike="noStrike">
               <a:solidFill>
                 <a:srgbClr val="000000"/>
@@ -5179,8 +5075,8 @@
         </p:nvSpPr>
         <p:spPr>
           <a:xfrm flipH="1">
-            <a:off x="8816400" y="33798960"/>
-            <a:ext cx="5398920" cy="1798920"/>
+            <a:off x="8204400" y="34374960"/>
+            <a:ext cx="5398560" cy="1798560"/>
           </a:xfrm>
           <a:prstGeom prst="foldedCorner">
             <a:avLst>
@@ -5190,22 +5086,17 @@
           <a:solidFill>
             <a:srgbClr val="0070c0"/>
           </a:solidFill>
-          <a:ln>
+          <a:ln w="25560">
+            <a:solidFill>
+              <a:srgbClr val="3a5f8b"/>
+            </a:solidFill>
             <a:round/>
           </a:ln>
         </p:spPr>
         <p:style>
-          <a:lnRef idx="2">
-            <a:schemeClr val="accent1">
-              <a:shade val="50000"/>
-            </a:schemeClr>
-          </a:lnRef>
-          <a:fillRef idx="1">
-            <a:schemeClr val="accent1"/>
-          </a:fillRef>
-          <a:effectRef idx="0">
-            <a:schemeClr val="accent1"/>
-          </a:effectRef>
+          <a:lnRef idx="0"/>
+          <a:fillRef idx="0"/>
+          <a:effectRef idx="0"/>
           <a:fontRef idx="minor"/>
         </p:style>
       </p:sp>
@@ -5217,8 +5108,8 @@
         </p:nvSpPr>
         <p:spPr>
           <a:xfrm>
-            <a:off x="9093240" y="33833880"/>
-            <a:ext cx="5204160" cy="1688760"/>
+            <a:off x="8481240" y="34409880"/>
+            <a:ext cx="5203800" cy="1688400"/>
           </a:xfrm>
           <a:prstGeom prst="rect">
             <a:avLst/>
@@ -5372,8 +5263,8 @@
         </p:nvSpPr>
         <p:spPr>
           <a:xfrm flipH="1">
-            <a:off x="3308400" y="33762240"/>
-            <a:ext cx="5326920" cy="1798920"/>
+            <a:off x="2696400" y="34338240"/>
+            <a:ext cx="5326560" cy="1798560"/>
           </a:xfrm>
           <a:prstGeom prst="foldedCorner">
             <a:avLst>
@@ -5381,26 +5272,19 @@
             </a:avLst>
           </a:prstGeom>
           <a:solidFill>
-            <a:schemeClr val="accent5">
-              <a:lumMod val="50000"/>
-            </a:schemeClr>
+            <a:srgbClr val="215968"/>
           </a:solidFill>
-          <a:ln>
+          <a:ln w="25560">
+            <a:solidFill>
+              <a:srgbClr val="3a5f8b"/>
+            </a:solidFill>
             <a:round/>
           </a:ln>
         </p:spPr>
         <p:style>
-          <a:lnRef idx="2">
-            <a:schemeClr val="accent1">
-              <a:shade val="50000"/>
-            </a:schemeClr>
-          </a:lnRef>
-          <a:fillRef idx="1">
-            <a:schemeClr val="accent1"/>
-          </a:fillRef>
-          <a:effectRef idx="0">
-            <a:schemeClr val="accent1"/>
-          </a:effectRef>
+          <a:lnRef idx="0"/>
+          <a:fillRef idx="0"/>
+          <a:effectRef idx="0"/>
           <a:fontRef idx="minor"/>
         </p:style>
         <p:txBody>
@@ -5563,8 +5447,8 @@
         </p:blipFill>
         <p:spPr>
           <a:xfrm>
-            <a:off x="8982720" y="34194600"/>
-            <a:ext cx="691560" cy="682920"/>
+            <a:off x="8370720" y="34770600"/>
+            <a:ext cx="691200" cy="682560"/>
           </a:xfrm>
           <a:prstGeom prst="rect">
             <a:avLst/>
@@ -5586,8 +5470,8 @@
         </p:blipFill>
         <p:spPr>
           <a:xfrm>
-            <a:off x="1604160" y="33845040"/>
-            <a:ext cx="1590480" cy="1674360"/>
+            <a:off x="992160" y="34421040"/>
+            <a:ext cx="1590120" cy="1674000"/>
           </a:xfrm>
           <a:prstGeom prst="rect">
             <a:avLst/>
@@ -5605,8 +5489,8 @@
         </p:nvSpPr>
         <p:spPr>
           <a:xfrm>
-            <a:off x="1463040" y="30625920"/>
-            <a:ext cx="11276280" cy="1004040"/>
+            <a:off x="1031040" y="30301920"/>
+            <a:ext cx="11275920" cy="1003680"/>
           </a:xfrm>
           <a:prstGeom prst="rect">
             <a:avLst/>
@@ -5668,7 +5552,7 @@
         <p:spPr>
           <a:xfrm flipH="1">
             <a:off x="17311680" y="38231280"/>
-            <a:ext cx="10209960" cy="729720"/>
+            <a:ext cx="10209600" cy="729360"/>
           </a:xfrm>
           <a:prstGeom prst="foldedCorner">
             <a:avLst>
@@ -5678,22 +5562,17 @@
           <a:solidFill>
             <a:srgbClr val="0070c0"/>
           </a:solidFill>
-          <a:ln>
+          <a:ln w="25560">
+            <a:solidFill>
+              <a:srgbClr val="3a5f8b"/>
+            </a:solidFill>
             <a:round/>
           </a:ln>
         </p:spPr>
         <p:style>
-          <a:lnRef idx="2">
-            <a:schemeClr val="accent1">
-              <a:shade val="50000"/>
-            </a:schemeClr>
-          </a:lnRef>
-          <a:fillRef idx="1">
-            <a:schemeClr val="accent1"/>
-          </a:fillRef>
-          <a:effectRef idx="0">
-            <a:schemeClr val="accent1"/>
-          </a:effectRef>
+          <a:lnRef idx="0"/>
+          <a:fillRef idx="0"/>
+          <a:effectRef idx="0"/>
           <a:fontRef idx="minor"/>
         </p:style>
       </p:sp>
@@ -5706,7 +5585,7 @@
         <p:spPr>
           <a:xfrm>
             <a:off x="17425800" y="38230200"/>
-            <a:ext cx="9841320" cy="638280"/>
+            <a:ext cx="9840960" cy="637920"/>
           </a:xfrm>
           <a:prstGeom prst="rect">
             <a:avLst/>
@@ -5767,8 +5646,8 @@
         </p:nvSpPr>
         <p:spPr>
           <a:xfrm flipH="1">
-            <a:off x="17281440" y="32357520"/>
-            <a:ext cx="10057680" cy="729720"/>
+            <a:off x="17278560" y="32357520"/>
+            <a:ext cx="10057320" cy="729360"/>
           </a:xfrm>
           <a:prstGeom prst="foldedCorner">
             <a:avLst>
@@ -5778,22 +5657,17 @@
           <a:solidFill>
             <a:srgbClr val="0070c0"/>
           </a:solidFill>
-          <a:ln>
+          <a:ln w="25560">
+            <a:solidFill>
+              <a:srgbClr val="3a5f8b"/>
+            </a:solidFill>
             <a:round/>
           </a:ln>
         </p:spPr>
         <p:style>
-          <a:lnRef idx="2">
-            <a:schemeClr val="accent1">
-              <a:shade val="50000"/>
-            </a:schemeClr>
-          </a:lnRef>
-          <a:fillRef idx="1">
-            <a:schemeClr val="accent1"/>
-          </a:fillRef>
-          <a:effectRef idx="0">
-            <a:schemeClr val="accent1"/>
-          </a:effectRef>
+          <a:lnRef idx="0"/>
+          <a:fillRef idx="0"/>
+          <a:effectRef idx="0"/>
           <a:fontRef idx="minor"/>
         </p:style>
       </p:sp>
@@ -5806,7 +5680,7 @@
         <p:spPr>
           <a:xfrm>
             <a:off x="17394120" y="32356440"/>
-            <a:ext cx="9694080" cy="638280"/>
+            <a:ext cx="9693720" cy="637920"/>
           </a:xfrm>
           <a:prstGeom prst="rect">
             <a:avLst/>
@@ -5867,8 +5741,8 @@
         </p:nvSpPr>
         <p:spPr>
           <a:xfrm flipH="1">
-            <a:off x="17372880" y="26505360"/>
-            <a:ext cx="9966240" cy="729720"/>
+            <a:off x="17370000" y="26505360"/>
+            <a:ext cx="9965880" cy="729360"/>
           </a:xfrm>
           <a:prstGeom prst="foldedCorner">
             <a:avLst>
@@ -5878,22 +5752,17 @@
           <a:solidFill>
             <a:srgbClr val="0070c0"/>
           </a:solidFill>
-          <a:ln>
+          <a:ln w="25560">
+            <a:solidFill>
+              <a:srgbClr val="3a5f8b"/>
+            </a:solidFill>
             <a:round/>
           </a:ln>
         </p:spPr>
         <p:style>
-          <a:lnRef idx="2">
-            <a:schemeClr val="accent1">
-              <a:shade val="50000"/>
-            </a:schemeClr>
-          </a:lnRef>
-          <a:fillRef idx="1">
-            <a:schemeClr val="accent1"/>
-          </a:fillRef>
-          <a:effectRef idx="0">
-            <a:schemeClr val="accent1"/>
-          </a:effectRef>
+          <a:lnRef idx="0"/>
+          <a:fillRef idx="0"/>
+          <a:effectRef idx="0"/>
           <a:fontRef idx="minor"/>
         </p:style>
       </p:sp>
@@ -5906,7 +5775,7 @@
         <p:spPr>
           <a:xfrm>
             <a:off x="17484840" y="26504280"/>
-            <a:ext cx="9605880" cy="638280"/>
+            <a:ext cx="9605520" cy="637920"/>
           </a:xfrm>
           <a:prstGeom prst="rect">
             <a:avLst/>
@@ -5967,8 +5836,8 @@
         </p:nvSpPr>
         <p:spPr>
           <a:xfrm>
-            <a:off x="-731520" y="35887680"/>
-            <a:ext cx="14904000" cy="3340080"/>
+            <a:off x="-1199520" y="36211680"/>
+            <a:ext cx="14903640" cy="3339720"/>
           </a:xfrm>
           <a:prstGeom prst="rect">
             <a:avLst/>
@@ -6218,9 +6087,9 @@
               <a:t>Docs: </a:t>
             </a:r>
             <a:r>
-              <a:rPr b="0" lang="en-US" sz="3600" spc="-1" strike="noStrike">
-                <a:solidFill>
-                  <a:srgbClr val="000000"/>
+              <a:rPr b="0" lang="en-US" sz="3600" spc="-1" strike="noStrike" u="sng">
+                <a:solidFill>
+                  <a:srgbClr val="0000ff"/>
                 </a:solidFill>
                 <a:uFill>
                   <a:solidFill>
@@ -6342,8 +6211,8 @@
         </p:nvSpPr>
         <p:spPr>
           <a:xfrm>
-            <a:off x="916200" y="25278840"/>
-            <a:ext cx="13987800" cy="4832280"/>
+            <a:off x="917280" y="24522480"/>
+            <a:ext cx="13987440" cy="190800"/>
           </a:xfrm>
           <a:prstGeom prst="rect">
             <a:avLst/>
@@ -6362,16 +6231,15 @@
         <p:txBody>
           <a:bodyPr lIns="90000" rIns="90000" tIns="45000" bIns="45000"/>
           <a:p>
-            <a:pPr marL="320040" indent="-319320">
+            <a:pPr marL="549720" indent="-548640">
               <a:lnSpc>
                 <a:spcPct val="100000"/>
               </a:lnSpc>
               <a:buClr>
                 <a:srgbClr val="000000"/>
               </a:buClr>
-              <a:buSzPct val="45000"/>
               <a:buFont typeface="Wingdings" charset="2"/>
-              <a:buChar char=""/>
+              <a:buChar char=""/>
             </a:pPr>
             <a:r>
               <a:rPr b="1" lang="en-US" sz="4000" spc="-1" strike="noStrike">
@@ -6386,7 +6254,7 @@
                 <a:latin typeface="Calibri"/>
                 <a:ea typeface="DejaVu Sans"/>
               </a:rPr>
-              <a:t>A modified version of the tool Ontmalizer was created to transform the XML Schemas and XML data was created.</a:t>
+              <a:t>A method to transform OPC UA schemas and instances into ontologies.</a:t>
             </a:r>
             <a:endParaRPr b="0" lang="en-US" sz="1800" spc="-1" strike="noStrike">
               <a:solidFill>
@@ -6401,16 +6269,15 @@
             </a:endParaRPr>
           </a:p>
           <a:p>
-            <a:pPr marL="320040" indent="-319320">
+            <a:pPr marL="549720" indent="-548640">
               <a:lnSpc>
                 <a:spcPct val="100000"/>
               </a:lnSpc>
               <a:buClr>
                 <a:srgbClr val="000000"/>
               </a:buClr>
-              <a:buSzPct val="45000"/>
               <a:buFont typeface="Wingdings" charset="2"/>
-              <a:buChar char=""/>
+              <a:buChar char=""/>
             </a:pPr>
             <a:r>
               <a:rPr b="1" lang="en-US" sz="4000" spc="-1" strike="noStrike">
@@ -6425,7 +6292,38 @@
                 <a:latin typeface="Calibri"/>
                 <a:ea typeface="DejaVu Sans"/>
               </a:rPr>
-              <a:t>Those changes were done taking in account the OPC UA standard.</a:t>
+              <a:t>The above method was created taking advantage of the tool Ontmalizer (</a:t>
+            </a:r>
+            <a:r>
+              <a:rPr b="1" lang="en-US" sz="4000" spc="-1" strike="noStrike">
+                <a:solidFill>
+                  <a:srgbClr val="000000"/>
+                </a:solidFill>
+                <a:uFill>
+                  <a:solidFill>
+                    <a:srgbClr val="ffffff"/>
+                  </a:solidFill>
+                </a:uFill>
+                <a:latin typeface="Calibri"/>
+                <a:ea typeface="DejaVu Sans"/>
+                <a:hlinkClick r:id="rId23"/>
+              </a:rPr>
+              <a:t>http://github.com/srdc/ontmalizer</a:t>
+            </a:r>
+            <a:r>
+              <a:rPr b="1" lang="en-US" sz="4000" spc="-1" strike="noStrike">
+                <a:solidFill>
+                  <a:srgbClr val="000000"/>
+                </a:solidFill>
+                <a:uFill>
+                  <a:solidFill>
+                    <a:srgbClr val="ffffff"/>
+                  </a:solidFill>
+                </a:uFill>
+                <a:latin typeface="Calibri"/>
+                <a:ea typeface="DejaVu Sans"/>
+              </a:rPr>
+              <a:t> ). A modified version was created.</a:t>
             </a:r>
             <a:endParaRPr b="0" lang="en-US" sz="1800" spc="-1" strike="noStrike">
               <a:solidFill>
@@ -6440,16 +6338,15 @@
             </a:endParaRPr>
           </a:p>
           <a:p>
-            <a:pPr marL="320040" indent="-319320">
+            <a:pPr marL="549720" indent="-548640">
               <a:lnSpc>
                 <a:spcPct val="100000"/>
               </a:lnSpc>
               <a:buClr>
                 <a:srgbClr val="000000"/>
               </a:buClr>
-              <a:buSzPct val="45000"/>
               <a:buFont typeface="Wingdings" charset="2"/>
-              <a:buChar char=""/>
+              <a:buChar char=""/>
             </a:pPr>
             <a:r>
               <a:rPr b="1" lang="en-US" sz="4000" spc="-1" strike="noStrike">
@@ -6464,7 +6361,7 @@
                 <a:latin typeface="Calibri"/>
                 <a:ea typeface="DejaVu Sans"/>
               </a:rPr>
-              <a:t>Tests were implemented in server and client application.</a:t>
+              <a:t>To ensure the compliance of requirements tests of the main methods were implemented in server and client application.</a:t>
             </a:r>
             <a:endParaRPr b="0" lang="en-US" sz="1800" spc="-1" strike="noStrike">
               <a:solidFill>
@@ -6479,16 +6376,15 @@
             </a:endParaRPr>
           </a:p>
           <a:p>
-            <a:pPr marL="320040" indent="-319320">
+            <a:pPr marL="549720" indent="-548640">
               <a:lnSpc>
                 <a:spcPct val="100000"/>
               </a:lnSpc>
               <a:buClr>
                 <a:srgbClr val="000000"/>
               </a:buClr>
-              <a:buSzPct val="45000"/>
               <a:buFont typeface="Wingdings" charset="2"/>
-              <a:buChar char=""/>
+              <a:buChar char=""/>
             </a:pPr>
             <a:r>
               <a:rPr b="1" lang="en-US" sz="4000" spc="-1" strike="noStrike">
@@ -6503,7 +6399,7 @@
                 <a:latin typeface="Calibri"/>
                 <a:ea typeface="DejaVu Sans"/>
               </a:rPr>
-              <a:t>A production deployment was done with Docker.</a:t>
+              <a:t>A production deployment was done using Docker.</a:t>
             </a:r>
             <a:endParaRPr b="0" lang="en-US" sz="1800" spc="-1" strike="noStrike">
               <a:solidFill>
@@ -6518,16 +6414,15 @@
             </a:endParaRPr>
           </a:p>
           <a:p>
-            <a:pPr marL="320040" indent="-319320">
+            <a:pPr marL="549720" indent="-548640">
               <a:lnSpc>
                 <a:spcPct val="100000"/>
               </a:lnSpc>
               <a:buClr>
                 <a:srgbClr val="000000"/>
               </a:buClr>
-              <a:buSzPct val="45000"/>
               <a:buFont typeface="Wingdings" charset="2"/>
-              <a:buChar char=""/>
+              <a:buChar char=""/>
             </a:pPr>
             <a:r>
               <a:rPr b="1" lang="en-US" sz="4000" spc="-1" strike="noStrike">
@@ -6542,7 +6437,188 @@
                 <a:latin typeface="Calibri"/>
                 <a:ea typeface="DejaVu Sans"/>
               </a:rPr>
-              <a:t>The project is ready to be improved in later stages.</a:t>
+              <a:t>It is possible to improve the current product in later stages.</a:t>
+            </a:r>
+            <a:endParaRPr b="0" lang="en-US" sz="1800" spc="-1" strike="noStrike">
+              <a:solidFill>
+                <a:srgbClr val="000000"/>
+              </a:solidFill>
+              <a:uFill>
+                <a:solidFill>
+                  <a:srgbClr val="ffffff"/>
+                </a:solidFill>
+              </a:uFill>
+              <a:latin typeface="Arial"/>
+            </a:endParaRPr>
+          </a:p>
+        </p:txBody>
+      </p:sp>
+      <p:sp>
+        <p:nvSpPr>
+          <p:cNvPr id="89" name="CustomShape 34"/>
+          <p:cNvSpPr/>
+          <p:nvPr/>
+        </p:nvSpPr>
+        <p:spPr>
+          <a:xfrm>
+            <a:off x="916200" y="19411200"/>
+            <a:ext cx="13987440" cy="3541320"/>
+          </a:xfrm>
+          <a:prstGeom prst="rect">
+            <a:avLst/>
+          </a:prstGeom>
+          <a:noFill/>
+          <a:ln>
+            <a:noFill/>
+          </a:ln>
+        </p:spPr>
+        <p:style>
+          <a:lnRef idx="0"/>
+          <a:fillRef idx="0"/>
+          <a:effectRef idx="0"/>
+          <a:fontRef idx="minor"/>
+        </p:style>
+        <p:txBody>
+          <a:bodyPr lIns="90000" rIns="90000" tIns="45000" bIns="45000"/>
+          <a:p>
+            <a:pPr marL="549720" indent="-548640">
+              <a:lnSpc>
+                <a:spcPct val="100000"/>
+              </a:lnSpc>
+              <a:buClr>
+                <a:srgbClr val="000000"/>
+              </a:buClr>
+              <a:buFont typeface="Wingdings" charset="2"/>
+              <a:buChar char=""/>
+            </a:pPr>
+            <a:r>
+              <a:rPr b="1" lang="en-US" sz="4000" spc="-1" strike="noStrike">
+                <a:solidFill>
+                  <a:srgbClr val="000000"/>
+                </a:solidFill>
+                <a:uFill>
+                  <a:solidFill>
+                    <a:srgbClr val="ffffff"/>
+                  </a:solidFill>
+                </a:uFill>
+                <a:latin typeface="Calibri"/>
+                <a:ea typeface="DejaVu Sans"/>
+              </a:rPr>
+              <a:t>Few relevant works managing the conversion from the standard into semantic formats.</a:t>
+            </a:r>
+            <a:endParaRPr b="0" lang="en-US" sz="1800" spc="-1" strike="noStrike">
+              <a:solidFill>
+                <a:srgbClr val="000000"/>
+              </a:solidFill>
+              <a:uFill>
+                <a:solidFill>
+                  <a:srgbClr val="ffffff"/>
+                </a:solidFill>
+              </a:uFill>
+              <a:latin typeface="Arial"/>
+            </a:endParaRPr>
+          </a:p>
+          <a:p>
+            <a:pPr marL="549720" indent="-548640">
+              <a:lnSpc>
+                <a:spcPct val="100000"/>
+              </a:lnSpc>
+              <a:buClr>
+                <a:srgbClr val="000000"/>
+              </a:buClr>
+              <a:buFont typeface="Wingdings" charset="2"/>
+              <a:buChar char=""/>
+            </a:pPr>
+            <a:r>
+              <a:rPr b="1" lang="en-US" sz="4000" spc="-1" strike="noStrike">
+                <a:solidFill>
+                  <a:srgbClr val="000000"/>
+                </a:solidFill>
+                <a:uFill>
+                  <a:solidFill>
+                    <a:srgbClr val="ffffff"/>
+                  </a:solidFill>
+                </a:uFill>
+                <a:latin typeface="Calibri"/>
+                <a:ea typeface="DejaVu Sans"/>
+              </a:rPr>
+              <a:t>Understand some details from OPC UA documentation.</a:t>
+            </a:r>
+            <a:endParaRPr b="0" lang="en-US" sz="1800" spc="-1" strike="noStrike">
+              <a:solidFill>
+                <a:srgbClr val="000000"/>
+              </a:solidFill>
+              <a:uFill>
+                <a:solidFill>
+                  <a:srgbClr val="ffffff"/>
+                </a:solidFill>
+              </a:uFill>
+              <a:latin typeface="Arial"/>
+            </a:endParaRPr>
+          </a:p>
+          <a:p>
+            <a:pPr marL="549720" indent="-548640">
+              <a:lnSpc>
+                <a:spcPct val="100000"/>
+              </a:lnSpc>
+              <a:buClr>
+                <a:srgbClr val="000000"/>
+              </a:buClr>
+              <a:buFont typeface="Wingdings" charset="2"/>
+              <a:buChar char=""/>
+            </a:pPr>
+            <a:r>
+              <a:rPr b="1" lang="en-US" sz="4000" spc="-1" strike="noStrike">
+                <a:solidFill>
+                  <a:srgbClr val="000000"/>
+                </a:solidFill>
+                <a:uFill>
+                  <a:solidFill>
+                    <a:srgbClr val="ffffff"/>
+                  </a:solidFill>
+                </a:uFill>
+                <a:latin typeface="Calibri"/>
+                <a:ea typeface="DejaVu Sans"/>
+              </a:rPr>
+              <a:t>The access to the original files was restricted and private. We had few (but enough) material to work with.</a:t>
+            </a:r>
+            <a:endParaRPr b="0" lang="en-US" sz="1800" spc="-1" strike="noStrike">
+              <a:solidFill>
+                <a:srgbClr val="000000"/>
+              </a:solidFill>
+              <a:uFill>
+                <a:solidFill>
+                  <a:srgbClr val="ffffff"/>
+                </a:solidFill>
+              </a:uFill>
+              <a:latin typeface="Arial"/>
+            </a:endParaRPr>
+          </a:p>
+          <a:p>
+            <a:pPr marL="549720" indent="-548640">
+              <a:lnSpc>
+                <a:spcPct val="100000"/>
+              </a:lnSpc>
+              <a:buClr>
+                <a:srgbClr val="000000"/>
+              </a:buClr>
+              <a:buFont typeface="Wingdings" charset="2"/>
+              <a:buChar char=""/>
+            </a:pPr>
+            <a:r>
+              <a:rPr b="1" lang="en-US" sz="4000" spc="-1" strike="noStrike">
+                <a:solidFill>
+                  <a:srgbClr val="000000"/>
+                </a:solidFill>
+                <a:uFill>
+                  <a:solidFill>
+                    <a:srgbClr val="ffffff"/>
+                  </a:solidFill>
+                </a:uFill>
+                <a:latin typeface="Calibri"/>
+                <a:ea typeface="DejaVu Sans"/>
+              </a:rPr>
+              <a:t>Plug different technologies in the front-end and back-end.</a:t>
             </a:r>
             <a:endParaRPr b="0" lang="en-US" sz="1800" spc="-1" strike="noStrike">
               <a:solidFill>

</xml_diff>

<commit_message>
Updated credentials of VM in the poster
</commit_message>
<xml_diff>
--- a/7poster/poster.pptx
+++ b/7poster/poster.pptx
@@ -64,7 +64,7 @@
         <p:spPr>
           <a:xfrm>
             <a:off x="1513800" y="1707840"/>
-            <a:ext cx="27251280" cy="7147800"/>
+            <a:ext cx="27250920" cy="7147440"/>
           </a:xfrm>
           <a:prstGeom prst="rect">
             <a:avLst/>
@@ -195,7 +195,7 @@
         <p:spPr>
           <a:xfrm>
             <a:off x="1513800" y="1707840"/>
-            <a:ext cx="27251280" cy="7147800"/>
+            <a:ext cx="27250920" cy="7147440"/>
           </a:xfrm>
           <a:prstGeom prst="rect">
             <a:avLst/>
@@ -398,7 +398,7 @@
         <p:spPr>
           <a:xfrm>
             <a:off x="1513800" y="1707840"/>
-            <a:ext cx="27251280" cy="7147800"/>
+            <a:ext cx="27250920" cy="7147440"/>
           </a:xfrm>
           <a:prstGeom prst="rect">
             <a:avLst/>
@@ -575,7 +575,7 @@
         <p:spPr>
           <a:xfrm>
             <a:off x="1513800" y="1707840"/>
-            <a:ext cx="27251280" cy="7147800"/>
+            <a:ext cx="27250920" cy="7147440"/>
           </a:xfrm>
           <a:prstGeom prst="rect">
             <a:avLst/>
@@ -671,7 +671,7 @@
         <p:spPr>
           <a:xfrm>
             <a:off x="1513800" y="1707840"/>
-            <a:ext cx="27251280" cy="7147800"/>
+            <a:ext cx="27250920" cy="7147440"/>
           </a:xfrm>
           <a:prstGeom prst="rect">
             <a:avLst/>
@@ -766,7 +766,7 @@
         <p:spPr>
           <a:xfrm>
             <a:off x="1513800" y="1707840"/>
-            <a:ext cx="27251280" cy="7147800"/>
+            <a:ext cx="27250920" cy="7147440"/>
           </a:xfrm>
           <a:prstGeom prst="rect">
             <a:avLst/>
@@ -897,7 +897,7 @@
         <p:spPr>
           <a:xfrm>
             <a:off x="1513800" y="1707840"/>
-            <a:ext cx="27251280" cy="7147800"/>
+            <a:ext cx="27250920" cy="7147440"/>
           </a:xfrm>
           <a:prstGeom prst="rect">
             <a:avLst/>
@@ -956,7 +956,7 @@
         <p:spPr>
           <a:xfrm>
             <a:off x="1513800" y="1707840"/>
-            <a:ext cx="27251280" cy="33134400"/>
+            <a:ext cx="27250920" cy="33132600"/>
           </a:xfrm>
           <a:prstGeom prst="rect">
             <a:avLst/>
@@ -1015,7 +1015,7 @@
         <p:spPr>
           <a:xfrm>
             <a:off x="1513800" y="1707840"/>
-            <a:ext cx="27251280" cy="7147800"/>
+            <a:ext cx="27250920" cy="7147440"/>
           </a:xfrm>
           <a:prstGeom prst="rect">
             <a:avLst/>
@@ -1182,7 +1182,7 @@
         <p:spPr>
           <a:xfrm>
             <a:off x="1513800" y="1707840"/>
-            <a:ext cx="27251280" cy="7147800"/>
+            <a:ext cx="27250920" cy="7147440"/>
           </a:xfrm>
           <a:prstGeom prst="rect">
             <a:avLst/>
@@ -1349,7 +1349,7 @@
         <p:spPr>
           <a:xfrm>
             <a:off x="1513800" y="1707840"/>
-            <a:ext cx="27251280" cy="7147800"/>
+            <a:ext cx="27250920" cy="7147440"/>
           </a:xfrm>
           <a:prstGeom prst="rect">
             <a:avLst/>
@@ -1579,7 +1579,7 @@
         <p:spPr>
           <a:xfrm>
             <a:off x="1513800" y="1707840"/>
-            <a:ext cx="27251280" cy="7147800"/>
+            <a:ext cx="27250920" cy="7147440"/>
           </a:xfrm>
           <a:prstGeom prst="rect">
             <a:avLst/>
@@ -1589,20 +1589,6 @@
           <a:bodyPr lIns="0" rIns="0" tIns="0" bIns="0" anchor="ctr"/>
           <a:p>
             <a:pPr algn="ctr"/>
-            <a:r>
-              <a:rPr b="0" lang="en-US" sz="4400" spc="-1" strike="noStrike">
-                <a:solidFill>
-                  <a:srgbClr val="000000"/>
-                </a:solidFill>
-                <a:uFill>
-                  <a:solidFill>
-                    <a:srgbClr val="ffffff"/>
-                  </a:solidFill>
-                </a:uFill>
-                <a:latin typeface="Arial"/>
-              </a:rPr>
-              <a:t>Click to edit the title text format</a:t>
-            </a:r>
             <a:endParaRPr b="0" lang="en-US" sz="4400" spc="-1" strike="noStrike">
               <a:solidFill>
                 <a:srgbClr val="000000"/>
@@ -1938,7 +1924,7 @@
         <p:spPr>
           <a:xfrm>
             <a:off x="6384240" y="6480"/>
-            <a:ext cx="21933720" cy="2191320"/>
+            <a:ext cx="21933360" cy="2190960"/>
           </a:xfrm>
           <a:prstGeom prst="rect">
             <a:avLst/>
@@ -2000,7 +1986,7 @@
         <p:spPr>
           <a:xfrm>
             <a:off x="5028480" y="2653560"/>
-            <a:ext cx="24833520" cy="1506960"/>
+            <a:ext cx="24833160" cy="1506600"/>
           </a:xfrm>
           <a:prstGeom prst="rect">
             <a:avLst/>
@@ -2090,7 +2076,7 @@
         <p:spPr>
           <a:xfrm>
             <a:off x="1026360" y="5924160"/>
-            <a:ext cx="12871440" cy="2007000"/>
+            <a:ext cx="12871080" cy="2006640"/>
           </a:xfrm>
           <a:prstGeom prst="rect">
             <a:avLst/>
@@ -2156,7 +2142,7 @@
         <p:spPr>
           <a:xfrm>
             <a:off x="19578600" y="39930480"/>
-            <a:ext cx="8555400" cy="2098800"/>
+            <a:ext cx="8555040" cy="2098440"/>
           </a:xfrm>
           <a:prstGeom prst="rect">
             <a:avLst/>
@@ -2206,7 +2192,7 @@
         <p:spPr>
           <a:xfrm>
             <a:off x="1026360" y="7200360"/>
-            <a:ext cx="11273760" cy="696600"/>
+            <a:ext cx="11273400" cy="696240"/>
           </a:xfrm>
           <a:prstGeom prst="rect">
             <a:avLst/>
@@ -2232,7 +2218,7 @@
         <p:spPr>
           <a:xfrm>
             <a:off x="4509360" y="40060440"/>
-            <a:ext cx="10411200" cy="1716840"/>
+            <a:ext cx="10410840" cy="1716480"/>
           </a:xfrm>
           <a:prstGeom prst="rect">
             <a:avLst/>
@@ -2327,7 +2313,7 @@
         <p:spPr>
           <a:xfrm>
             <a:off x="1098360" y="39512520"/>
-            <a:ext cx="3720960" cy="2304000"/>
+            <a:ext cx="3720600" cy="2303640"/>
           </a:xfrm>
           <a:prstGeom prst="rect">
             <a:avLst/>
@@ -2419,7 +2405,7 @@
         <p:spPr>
           <a:xfrm>
             <a:off x="14356080" y="7178760"/>
-            <a:ext cx="11273760" cy="696600"/>
+            <a:ext cx="11273400" cy="696240"/>
           </a:xfrm>
           <a:prstGeom prst="rect">
             <a:avLst/>
@@ -2445,7 +2431,7 @@
         <p:spPr>
           <a:xfrm>
             <a:off x="14356080" y="7178760"/>
-            <a:ext cx="11273760" cy="696600"/>
+            <a:ext cx="11273400" cy="696240"/>
           </a:xfrm>
           <a:prstGeom prst="rect">
             <a:avLst/>
@@ -2471,7 +2457,7 @@
         <p:spPr>
           <a:xfrm>
             <a:off x="914400" y="23169240"/>
-            <a:ext cx="14849280" cy="1549800"/>
+            <a:ext cx="14848920" cy="1549440"/>
           </a:xfrm>
           <a:prstGeom prst="rect">
             <a:avLst/>
@@ -2533,7 +2519,7 @@
         <p:spPr>
           <a:xfrm>
             <a:off x="15087600" y="12369240"/>
-            <a:ext cx="13987440" cy="2626920"/>
+            <a:ext cx="13987080" cy="2626560"/>
           </a:xfrm>
           <a:prstGeom prst="rect">
             <a:avLst/>
@@ -2552,7 +2538,7 @@
         <p:txBody>
           <a:bodyPr lIns="90000" rIns="90000" tIns="45000" bIns="45000"/>
           <a:p>
-            <a:pPr marL="548640" indent="-548640">
+            <a:pPr marL="548640" indent="-548280">
               <a:lnSpc>
                 <a:spcPct val="100000"/>
               </a:lnSpc>
@@ -2590,7 +2576,7 @@
             </a:endParaRPr>
           </a:p>
           <a:p>
-            <a:pPr marL="548640" indent="-548640">
+            <a:pPr marL="548640" indent="-548280">
               <a:lnSpc>
                 <a:spcPct val="100000"/>
               </a:lnSpc>
@@ -2638,7 +2624,7 @@
         <p:spPr>
           <a:xfrm>
             <a:off x="10425240" y="4070880"/>
-            <a:ext cx="13896000" cy="912600"/>
+            <a:ext cx="13895640" cy="912240"/>
           </a:xfrm>
           <a:prstGeom prst="rect">
             <a:avLst/>
@@ -2704,7 +2690,7 @@
         <p:spPr>
           <a:xfrm>
             <a:off x="1747800" y="1576080"/>
-            <a:ext cx="2803680" cy="2514600"/>
+            <a:ext cx="2803320" cy="2514240"/>
           </a:xfrm>
           <a:prstGeom prst="rect">
             <a:avLst/>
@@ -2727,7 +2713,7 @@
         <p:spPr>
           <a:xfrm>
             <a:off x="1535040" y="14253120"/>
-            <a:ext cx="5205960" cy="2925000"/>
+            <a:ext cx="5205600" cy="2924640"/>
           </a:xfrm>
           <a:prstGeom prst="rect">
             <a:avLst/>
@@ -2750,7 +2736,7 @@
         <p:spPr>
           <a:xfrm>
             <a:off x="5841000" y="12845520"/>
-            <a:ext cx="8349840" cy="4912200"/>
+            <a:ext cx="8349480" cy="4911840"/>
           </a:xfrm>
           <a:prstGeom prst="rect">
             <a:avLst/>
@@ -2769,7 +2755,7 @@
         <p:spPr>
           <a:xfrm flipH="1">
             <a:off x="842760" y="7327800"/>
-            <a:ext cx="13074840" cy="5124600"/>
+            <a:ext cx="13074480" cy="5124240"/>
           </a:xfrm>
           <a:prstGeom prst="foldedCorner">
             <a:avLst>
@@ -2833,7 +2819,7 @@
             </a:endParaRPr>
           </a:p>
           <a:p>
-            <a:pPr marL="571680" indent="-570240" algn="just">
+            <a:pPr marL="571680" indent="-569880" algn="just">
               <a:lnSpc>
                 <a:spcPct val="100000"/>
               </a:lnSpc>
@@ -2871,7 +2857,7 @@
             </a:endParaRPr>
           </a:p>
           <a:p>
-            <a:pPr marL="571680" indent="-570240" algn="just">
+            <a:pPr marL="571680" indent="-569880" algn="just">
               <a:lnSpc>
                 <a:spcPct val="100000"/>
               </a:lnSpc>
@@ -2909,7 +2895,7 @@
             </a:endParaRPr>
           </a:p>
           <a:p>
-            <a:pPr marL="571680" indent="-570240" algn="just">
+            <a:pPr marL="571680" indent="-569880" algn="just">
               <a:lnSpc>
                 <a:spcPct val="100000"/>
               </a:lnSpc>
@@ -2957,7 +2943,7 @@
         <p:spPr>
           <a:xfrm flipH="1">
             <a:off x="15156000" y="7301880"/>
-            <a:ext cx="14125320" cy="3560040"/>
+            <a:ext cx="14124960" cy="3559680"/>
           </a:xfrm>
           <a:prstGeom prst="foldedCorner">
             <a:avLst>
@@ -3003,7 +2989,7 @@
             </a:endParaRPr>
           </a:p>
           <a:p>
-            <a:pPr marL="571680" indent="-570240" algn="just">
+            <a:pPr marL="571680" indent="-569880" algn="just">
               <a:lnSpc>
                 <a:spcPct val="100000"/>
               </a:lnSpc>
@@ -3041,7 +3027,7 @@
             </a:endParaRPr>
           </a:p>
           <a:p>
-            <a:pPr marL="571680" indent="-570240" algn="just">
+            <a:pPr marL="571680" indent="-569880" algn="just">
               <a:lnSpc>
                 <a:spcPct val="100000"/>
               </a:lnSpc>
@@ -3089,7 +3075,7 @@
         <p:spPr>
           <a:xfrm>
             <a:off x="15138360" y="6008040"/>
-            <a:ext cx="14121360" cy="1905120"/>
+            <a:ext cx="14121000" cy="1904760"/>
           </a:xfrm>
           <a:prstGeom prst="rect">
             <a:avLst/>
@@ -3151,7 +3137,7 @@
         <p:spPr>
           <a:xfrm>
             <a:off x="842400" y="17890200"/>
-            <a:ext cx="14849280" cy="2007000"/>
+            <a:ext cx="14848920" cy="2006640"/>
           </a:xfrm>
           <a:prstGeom prst="rect">
             <a:avLst/>
@@ -3217,7 +3203,7 @@
         <p:spPr>
           <a:xfrm>
             <a:off x="17965440" y="15212880"/>
-            <a:ext cx="8800920" cy="5813280"/>
+            <a:ext cx="8800560" cy="5812920"/>
           </a:xfrm>
           <a:prstGeom prst="rect">
             <a:avLst/>
@@ -3240,7 +3226,7 @@
         <p:spPr>
           <a:xfrm>
             <a:off x="26980560" y="17274600"/>
-            <a:ext cx="2122560" cy="1083240"/>
+            <a:ext cx="2122200" cy="1082880"/>
           </a:xfrm>
           <a:prstGeom prst="rect">
             <a:avLst/>
@@ -3263,7 +3249,7 @@
         <p:spPr>
           <a:xfrm>
             <a:off x="27127440" y="18789480"/>
-            <a:ext cx="1852560" cy="1419480"/>
+            <a:ext cx="1852200" cy="1419120"/>
           </a:xfrm>
           <a:prstGeom prst="rect">
             <a:avLst/>
@@ -3286,7 +3272,7 @@
         <p:spPr>
           <a:xfrm>
             <a:off x="26942040" y="15447960"/>
-            <a:ext cx="2281680" cy="1279080"/>
+            <a:ext cx="2281320" cy="1278720"/>
           </a:xfrm>
           <a:prstGeom prst="rect">
             <a:avLst/>
@@ -3309,7 +3295,7 @@
         <p:spPr>
           <a:xfrm>
             <a:off x="26802000" y="20005920"/>
-            <a:ext cx="2338920" cy="1753200"/>
+            <a:ext cx="2338560" cy="1752840"/>
           </a:xfrm>
           <a:prstGeom prst="rect">
             <a:avLst/>
@@ -3332,7 +3318,7 @@
         <p:spPr>
           <a:xfrm>
             <a:off x="15436800" y="19538280"/>
-            <a:ext cx="2923920" cy="1521000"/>
+            <a:ext cx="2923560" cy="1520640"/>
           </a:xfrm>
           <a:prstGeom prst="rect">
             <a:avLst/>
@@ -3355,7 +3341,7 @@
         <p:spPr>
           <a:xfrm>
             <a:off x="15583680" y="18119160"/>
-            <a:ext cx="1187640" cy="1107720"/>
+            <a:ext cx="1187280" cy="1107360"/>
           </a:xfrm>
           <a:prstGeom prst="rect">
             <a:avLst/>
@@ -3378,7 +3364,7 @@
         <p:spPr>
           <a:xfrm>
             <a:off x="15377400" y="16759080"/>
-            <a:ext cx="2072880" cy="988200"/>
+            <a:ext cx="2072520" cy="987840"/>
           </a:xfrm>
           <a:prstGeom prst="rect">
             <a:avLst/>
@@ -3401,7 +3387,7 @@
         <p:spPr>
           <a:xfrm>
             <a:off x="15462360" y="15384600"/>
-            <a:ext cx="2151360" cy="1074240"/>
+            <a:ext cx="2151000" cy="1073880"/>
           </a:xfrm>
           <a:prstGeom prst="rect">
             <a:avLst/>
@@ -3420,7 +3406,7 @@
         <p:spPr>
           <a:xfrm>
             <a:off x="15087600" y="10945080"/>
-            <a:ext cx="14172120" cy="1413000"/>
+            <a:ext cx="14171760" cy="1412640"/>
           </a:xfrm>
           <a:prstGeom prst="rect">
             <a:avLst/>
@@ -3486,7 +3472,7 @@
         <p:spPr>
           <a:xfrm>
             <a:off x="17547840" y="21688200"/>
-            <a:ext cx="10331640" cy="5393880"/>
+            <a:ext cx="10331280" cy="5393520"/>
           </a:xfrm>
           <a:prstGeom prst="rect">
             <a:avLst/>
@@ -3509,7 +3495,7 @@
         <p:spPr>
           <a:xfrm>
             <a:off x="17550720" y="27460800"/>
-            <a:ext cx="10423080" cy="5393880"/>
+            <a:ext cx="10422720" cy="5393520"/>
           </a:xfrm>
           <a:prstGeom prst="rect">
             <a:avLst/>
@@ -3532,7 +3518,7 @@
         <p:spPr>
           <a:xfrm>
             <a:off x="17495280" y="33303240"/>
-            <a:ext cx="10514520" cy="5393880"/>
+            <a:ext cx="10514160" cy="5393520"/>
           </a:xfrm>
           <a:prstGeom prst="rect">
             <a:avLst/>
@@ -3551,7 +3537,7 @@
         <p:spPr>
           <a:xfrm>
             <a:off x="27223920" y="26282520"/>
-            <a:ext cx="1958040" cy="1966680"/>
+            <a:ext cx="1957680" cy="1966320"/>
           </a:xfrm>
           <a:custGeom>
             <a:avLst/>
@@ -4152,7 +4138,7 @@
         <p:spPr>
           <a:xfrm>
             <a:off x="27224280" y="32125680"/>
-            <a:ext cx="1958040" cy="1966680"/>
+            <a:ext cx="1957680" cy="1966320"/>
           </a:xfrm>
           <a:custGeom>
             <a:avLst/>
@@ -4753,7 +4739,7 @@
         <p:spPr>
           <a:xfrm>
             <a:off x="-1124640" y="31122720"/>
-            <a:ext cx="14537880" cy="3215520"/>
+            <a:ext cx="14537520" cy="3215160"/>
           </a:xfrm>
           <a:prstGeom prst="rect">
             <a:avLst/>
@@ -5075,8 +5061,8 @@
         </p:nvSpPr>
         <p:spPr>
           <a:xfrm flipH="1">
-            <a:off x="8204400" y="34374960"/>
-            <a:ext cx="5398560" cy="1798560"/>
+            <a:off x="8203680" y="34374960"/>
+            <a:ext cx="5398200" cy="1798200"/>
           </a:xfrm>
           <a:prstGeom prst="foldedCorner">
             <a:avLst>
@@ -5109,7 +5095,7 @@
         <p:spPr>
           <a:xfrm>
             <a:off x="8481240" y="34409880"/>
-            <a:ext cx="5203800" cy="1688400"/>
+            <a:ext cx="5203440" cy="1688040"/>
           </a:xfrm>
           <a:prstGeom prst="rect">
             <a:avLst/>
@@ -5182,7 +5168,7 @@
               <a:t>Partner ID: </a:t>
             </a:r>
             <a:r>
-              <a:rPr b="1" lang="en-US" sz="2800" spc="-1" strike="noStrike">
+              <a:rPr b="1" lang="en-US" sz="3200" spc="-1" strike="noStrike">
                 <a:solidFill>
                   <a:srgbClr val="f79646"/>
                 </a:solidFill>
@@ -5194,7 +5180,7 @@
                 <a:latin typeface="Calibri"/>
                 <a:ea typeface="DejaVu Sans"/>
               </a:rPr>
-              <a:t>905 399 395</a:t>
+              <a:t>873 887 809</a:t>
             </a:r>
             <a:r>
               <a:rPr b="0" lang="en-US" sz="2800" spc="-1" strike="noStrike">
@@ -5263,8 +5249,8 @@
         </p:nvSpPr>
         <p:spPr>
           <a:xfrm flipH="1">
-            <a:off x="2696400" y="34338240"/>
-            <a:ext cx="5326560" cy="1798560"/>
+            <a:off x="2695680" y="34338240"/>
+            <a:ext cx="5326200" cy="1798200"/>
           </a:xfrm>
           <a:prstGeom prst="foldedCorner">
             <a:avLst>
@@ -5448,7 +5434,7 @@
         <p:spPr>
           <a:xfrm>
             <a:off x="8370720" y="34770600"/>
-            <a:ext cx="691200" cy="682560"/>
+            <a:ext cx="690840" cy="682200"/>
           </a:xfrm>
           <a:prstGeom prst="rect">
             <a:avLst/>
@@ -5471,7 +5457,7 @@
         <p:spPr>
           <a:xfrm>
             <a:off x="992160" y="34421040"/>
-            <a:ext cx="1590120" cy="1674000"/>
+            <a:ext cx="1589760" cy="1673640"/>
           </a:xfrm>
           <a:prstGeom prst="rect">
             <a:avLst/>
@@ -5490,7 +5476,7 @@
         <p:spPr>
           <a:xfrm>
             <a:off x="1031040" y="30301920"/>
-            <a:ext cx="11275920" cy="1003680"/>
+            <a:ext cx="11275560" cy="1003320"/>
           </a:xfrm>
           <a:prstGeom prst="rect">
             <a:avLst/>
@@ -5551,8 +5537,8 @@
         </p:nvSpPr>
         <p:spPr>
           <a:xfrm flipH="1">
-            <a:off x="17311680" y="38231280"/>
-            <a:ext cx="10209600" cy="729360"/>
+            <a:off x="17310960" y="38231280"/>
+            <a:ext cx="10209240" cy="729000"/>
           </a:xfrm>
           <a:prstGeom prst="foldedCorner">
             <a:avLst>
@@ -5585,7 +5571,7 @@
         <p:spPr>
           <a:xfrm>
             <a:off x="17425800" y="38230200"/>
-            <a:ext cx="9840960" cy="637920"/>
+            <a:ext cx="9840600" cy="637560"/>
           </a:xfrm>
           <a:prstGeom prst="rect">
             <a:avLst/>
@@ -5647,7 +5633,7 @@
         <p:spPr>
           <a:xfrm flipH="1">
             <a:off x="17278560" y="32357520"/>
-            <a:ext cx="10057320" cy="729360"/>
+            <a:ext cx="10056960" cy="729000"/>
           </a:xfrm>
           <a:prstGeom prst="foldedCorner">
             <a:avLst>
@@ -5680,7 +5666,7 @@
         <p:spPr>
           <a:xfrm>
             <a:off x="17394120" y="32356440"/>
-            <a:ext cx="9693720" cy="637920"/>
+            <a:ext cx="9693360" cy="637560"/>
           </a:xfrm>
           <a:prstGeom prst="rect">
             <a:avLst/>
@@ -5742,7 +5728,7 @@
         <p:spPr>
           <a:xfrm flipH="1">
             <a:off x="17370000" y="26505360"/>
-            <a:ext cx="9965880" cy="729360"/>
+            <a:ext cx="9965520" cy="729000"/>
           </a:xfrm>
           <a:prstGeom prst="foldedCorner">
             <a:avLst>
@@ -5775,7 +5761,7 @@
         <p:spPr>
           <a:xfrm>
             <a:off x="17484840" y="26504280"/>
-            <a:ext cx="9605520" cy="637920"/>
+            <a:ext cx="9605160" cy="637560"/>
           </a:xfrm>
           <a:prstGeom prst="rect">
             <a:avLst/>
@@ -5837,7 +5823,7 @@
         <p:spPr>
           <a:xfrm>
             <a:off x="-1199520" y="36211680"/>
-            <a:ext cx="14903640" cy="3339720"/>
+            <a:ext cx="14903280" cy="3339360"/>
           </a:xfrm>
           <a:prstGeom prst="rect">
             <a:avLst/>
@@ -6212,7 +6198,7 @@
         <p:spPr>
           <a:xfrm>
             <a:off x="917280" y="24522480"/>
-            <a:ext cx="13987440" cy="190800"/>
+            <a:ext cx="13987080" cy="190440"/>
           </a:xfrm>
           <a:prstGeom prst="rect">
             <a:avLst/>
@@ -6231,7 +6217,7 @@
         <p:txBody>
           <a:bodyPr lIns="90000" rIns="90000" tIns="45000" bIns="45000"/>
           <a:p>
-            <a:pPr marL="549720" indent="-548640">
+            <a:pPr marL="549720" indent="-548280">
               <a:lnSpc>
                 <a:spcPct val="100000"/>
               </a:lnSpc>
@@ -6269,7 +6255,7 @@
             </a:endParaRPr>
           </a:p>
           <a:p>
-            <a:pPr marL="549720" indent="-548640">
+            <a:pPr marL="549720" indent="-548280">
               <a:lnSpc>
                 <a:spcPct val="100000"/>
               </a:lnSpc>
@@ -6295,9 +6281,9 @@
               <a:t>The above method was created taking advantage of the tool Ontmalizer (</a:t>
             </a:r>
             <a:r>
-              <a:rPr b="1" lang="en-US" sz="4000" spc="-1" strike="noStrike">
-                <a:solidFill>
-                  <a:srgbClr val="000000"/>
+              <a:rPr b="1" lang="en-US" sz="4000" spc="-1" strike="noStrike" u="sng">
+                <a:solidFill>
+                  <a:srgbClr val="0000ff"/>
                 </a:solidFill>
                 <a:uFill>
                   <a:solidFill>
@@ -6338,7 +6324,7 @@
             </a:endParaRPr>
           </a:p>
           <a:p>
-            <a:pPr marL="549720" indent="-548640">
+            <a:pPr marL="549720" indent="-548280">
               <a:lnSpc>
                 <a:spcPct val="100000"/>
               </a:lnSpc>
@@ -6376,7 +6362,7 @@
             </a:endParaRPr>
           </a:p>
           <a:p>
-            <a:pPr marL="549720" indent="-548640">
+            <a:pPr marL="549720" indent="-548280">
               <a:lnSpc>
                 <a:spcPct val="100000"/>
               </a:lnSpc>
@@ -6414,7 +6400,7 @@
             </a:endParaRPr>
           </a:p>
           <a:p>
-            <a:pPr marL="549720" indent="-548640">
+            <a:pPr marL="549720" indent="-548280">
               <a:lnSpc>
                 <a:spcPct val="100000"/>
               </a:lnSpc>
@@ -6462,7 +6448,7 @@
         <p:spPr>
           <a:xfrm>
             <a:off x="916200" y="19411200"/>
-            <a:ext cx="13987440" cy="3541320"/>
+            <a:ext cx="13987080" cy="3540960"/>
           </a:xfrm>
           <a:prstGeom prst="rect">
             <a:avLst/>
@@ -6481,7 +6467,7 @@
         <p:txBody>
           <a:bodyPr lIns="90000" rIns="90000" tIns="45000" bIns="45000"/>
           <a:p>
-            <a:pPr marL="549720" indent="-548640">
+            <a:pPr marL="549720" indent="-548280">
               <a:lnSpc>
                 <a:spcPct val="100000"/>
               </a:lnSpc>
@@ -6519,7 +6505,7 @@
             </a:endParaRPr>
           </a:p>
           <a:p>
-            <a:pPr marL="549720" indent="-548640">
+            <a:pPr marL="549720" indent="-548280">
               <a:lnSpc>
                 <a:spcPct val="100000"/>
               </a:lnSpc>
@@ -6557,7 +6543,7 @@
             </a:endParaRPr>
           </a:p>
           <a:p>
-            <a:pPr marL="549720" indent="-548640">
+            <a:pPr marL="549720" indent="-548280">
               <a:lnSpc>
                 <a:spcPct val="100000"/>
               </a:lnSpc>
@@ -6595,7 +6581,7 @@
             </a:endParaRPr>
           </a:p>
           <a:p>
-            <a:pPr marL="549720" indent="-548640">
+            <a:pPr marL="549720" indent="-548280">
               <a:lnSpc>
                 <a:spcPct val="100000"/>
               </a:lnSpc>

</xml_diff>